<commit_message>
Minor change to poster layout and sizes
</commit_message>
<xml_diff>
--- a/Deadlines/Poster/CE301 Poster Template.pptx
+++ b/Deadlines/Poster/CE301 Poster Template.pptx
@@ -1097,8 +1097,8 @@
       </dsp:nvSpPr>
       <dsp:spPr>
         <a:xfrm>
-          <a:off x="1033" y="648219"/>
-          <a:ext cx="1259401" cy="503760"/>
+          <a:off x="1919" y="432322"/>
+          <a:ext cx="2338888" cy="935555"/>
         </a:xfrm>
         <a:prstGeom prst="chevron">
           <a:avLst/>
@@ -1164,12 +1164,12 @@
         </a:fontRef>
       </dsp:style>
       <dsp:txBody>
-        <a:bodyPr spcFirstLastPara="0" vert="horz" wrap="square" lIns="40005" tIns="13335" rIns="13335" bIns="13335" numCol="1" spcCol="1270" anchor="ctr" anchorCtr="0">
+        <a:bodyPr spcFirstLastPara="0" vert="horz" wrap="square" lIns="76010" tIns="25337" rIns="25337" bIns="25337" numCol="1" spcCol="1270" anchor="ctr" anchorCtr="0">
           <a:noAutofit/>
         </a:bodyPr>
         <a:lstStyle/>
         <a:p>
-          <a:pPr lvl="0" algn="ctr" defTabSz="444500">
+          <a:pPr lvl="0" algn="ctr" defTabSz="844550">
             <a:lnSpc>
               <a:spcPct val="90000"/>
             </a:lnSpc>
@@ -1181,15 +1181,15 @@
             </a:spcAft>
           </a:pPr>
           <a:r>
-            <a:rPr lang="en-GB" sz="1000" kern="1200" dirty="0" smtClean="0"/>
+            <a:rPr lang="en-GB" sz="1900" kern="1200" dirty="0" smtClean="0"/>
             <a:t>English Instructions</a:t>
           </a:r>
-          <a:endParaRPr lang="en-GB" sz="1000" kern="1200" dirty="0"/>
+          <a:endParaRPr lang="en-GB" sz="1900" kern="1200" dirty="0"/>
         </a:p>
       </dsp:txBody>
       <dsp:txXfrm>
-        <a:off x="1033" y="648219"/>
-        <a:ext cx="1259401" cy="503760"/>
+        <a:off x="1919" y="432322"/>
+        <a:ext cx="2338888" cy="935555"/>
       </dsp:txXfrm>
     </dsp:sp>
     <dsp:sp modelId="{7900F795-C8D7-4F95-B207-0505A1B7985F}">
@@ -1199,8 +1199,8 @@
       </dsp:nvSpPr>
       <dsp:spPr>
         <a:xfrm>
-          <a:off x="1080120" y="648073"/>
-          <a:ext cx="1259401" cy="503760"/>
+          <a:off x="2005938" y="432050"/>
+          <a:ext cx="2338888" cy="935555"/>
         </a:xfrm>
         <a:prstGeom prst="chevron">
           <a:avLst/>
@@ -1266,12 +1266,12 @@
         </a:fontRef>
       </dsp:style>
       <dsp:txBody>
-        <a:bodyPr spcFirstLastPara="0" vert="horz" wrap="square" lIns="40005" tIns="13335" rIns="13335" bIns="13335" numCol="1" spcCol="1270" anchor="ctr" anchorCtr="0">
+        <a:bodyPr spcFirstLastPara="0" vert="horz" wrap="square" lIns="76010" tIns="25337" rIns="25337" bIns="25337" numCol="1" spcCol="1270" anchor="ctr" anchorCtr="0">
           <a:noAutofit/>
         </a:bodyPr>
         <a:lstStyle/>
         <a:p>
-          <a:pPr lvl="0" algn="ctr" defTabSz="444500">
+          <a:pPr lvl="0" algn="ctr" defTabSz="844550">
             <a:lnSpc>
               <a:spcPct val="90000"/>
             </a:lnSpc>
@@ -1283,15 +1283,15 @@
             </a:spcAft>
           </a:pPr>
           <a:r>
-            <a:rPr lang="en-GB" sz="1000" kern="1200" dirty="0" smtClean="0"/>
+            <a:rPr lang="en-GB" sz="1900" kern="1200" dirty="0" smtClean="0"/>
             <a:t>POS Tagged Text</a:t>
           </a:r>
-          <a:endParaRPr lang="en-GB" sz="1000" kern="1200" dirty="0"/>
+          <a:endParaRPr lang="en-GB" sz="1900" kern="1200" dirty="0"/>
         </a:p>
       </dsp:txBody>
       <dsp:txXfrm>
-        <a:off x="1080120" y="648073"/>
-        <a:ext cx="1259401" cy="503760"/>
+        <a:off x="2005938" y="432050"/>
+        <a:ext cx="2338888" cy="935555"/>
       </dsp:txXfrm>
     </dsp:sp>
     <dsp:sp modelId="{458CD5DD-474C-46DD-A6B6-80289D7F42DA}">
@@ -1301,8 +1301,8 @@
       </dsp:nvSpPr>
       <dsp:spPr>
         <a:xfrm>
-          <a:off x="2267956" y="648219"/>
-          <a:ext cx="1259401" cy="503760"/>
+          <a:off x="4211919" y="432322"/>
+          <a:ext cx="2338888" cy="935555"/>
         </a:xfrm>
         <a:prstGeom prst="chevron">
           <a:avLst/>
@@ -1368,12 +1368,12 @@
         </a:fontRef>
       </dsp:style>
       <dsp:txBody>
-        <a:bodyPr spcFirstLastPara="0" vert="horz" wrap="square" lIns="40005" tIns="13335" rIns="13335" bIns="13335" numCol="1" spcCol="1270" anchor="ctr" anchorCtr="0">
+        <a:bodyPr spcFirstLastPara="0" vert="horz" wrap="square" lIns="76010" tIns="25337" rIns="25337" bIns="25337" numCol="1" spcCol="1270" anchor="ctr" anchorCtr="0">
           <a:noAutofit/>
         </a:bodyPr>
         <a:lstStyle/>
         <a:p>
-          <a:pPr lvl="0" algn="ctr" defTabSz="444500">
+          <a:pPr lvl="0" algn="ctr" defTabSz="844550">
             <a:lnSpc>
               <a:spcPct val="90000"/>
             </a:lnSpc>
@@ -1385,15 +1385,15 @@
             </a:spcAft>
           </a:pPr>
           <a:r>
-            <a:rPr lang="en-GB" sz="1000" kern="1200" dirty="0" smtClean="0"/>
+            <a:rPr lang="en-GB" sz="1900" kern="1200" dirty="0" smtClean="0"/>
             <a:t>SPL</a:t>
           </a:r>
-          <a:endParaRPr lang="en-GB" sz="1000" kern="1200" dirty="0"/>
+          <a:endParaRPr lang="en-GB" sz="1900" kern="1200" dirty="0"/>
         </a:p>
       </dsp:txBody>
       <dsp:txXfrm>
-        <a:off x="2267956" y="648219"/>
-        <a:ext cx="1259401" cy="503760"/>
+        <a:off x="4211919" y="432322"/>
+        <a:ext cx="2338888" cy="935555"/>
       </dsp:txXfrm>
     </dsp:sp>
   </dsp:spTree>
@@ -6253,7 +6253,7 @@
         <p:spPr bwMode="auto">
           <a:xfrm>
             <a:off x="7561262" y="2394373"/>
-            <a:ext cx="7272808" cy="4680519"/>
+            <a:ext cx="7272808" cy="2952327"/>
           </a:xfrm>
           <a:prstGeom prst="rect">
             <a:avLst/>
@@ -6358,8 +6358,8 @@
           <p:nvPr/>
         </p:nvGraphicFramePr>
         <p:xfrm>
-          <a:off x="3888854" y="7218908"/>
-          <a:ext cx="3528392" cy="1800200"/>
+          <a:off x="7993310" y="5058668"/>
+          <a:ext cx="6552728" cy="1800200"/>
         </p:xfrm>
         <a:graphic>
           <a:graphicData uri="http://schemas.openxmlformats.org/drawingml/2006/diagram">
@@ -6375,8 +6375,8 @@
         </p:nvSpPr>
         <p:spPr>
           <a:xfrm>
-            <a:off x="4104878" y="8587061"/>
-            <a:ext cx="2808312" cy="307777"/>
+            <a:off x="9577486" y="6426820"/>
+            <a:ext cx="3456384" cy="369332"/>
           </a:xfrm>
           <a:prstGeom prst="rect">
             <a:avLst/>
@@ -6389,16 +6389,119 @@
           </a:bodyPr>
           <a:lstStyle/>
           <a:p>
-            <a:pPr lvl="0"/>
-            <a:r>
-              <a:rPr lang="en-GB" sz="1400" dirty="0" smtClean="0"/>
+            <a:pPr lvl="0" algn="ctr"/>
+            <a:r>
+              <a:rPr lang="en-GB" sz="1800" dirty="0" smtClean="0"/>
               <a:t>The Natural Language </a:t>
             </a:r>
             <a:r>
-              <a:rPr lang="en-GB" sz="1400" dirty="0" smtClean="0"/>
+              <a:rPr lang="en-GB" sz="1800" dirty="0" smtClean="0"/>
               <a:t>Process</a:t>
             </a:r>
-            <a:endParaRPr lang="en-GB" sz="1400" dirty="0"/>
+            <a:endParaRPr lang="en-GB" sz="1800" dirty="0"/>
+          </a:p>
+        </p:txBody>
+      </p:sp>
+      <p:pic>
+        <p:nvPicPr>
+          <p:cNvPr id="17" name="Picture 16" descr="UI.png"/>
+          <p:cNvPicPr>
+            <a:picLocks noChangeAspect="1"/>
+          </p:cNvPicPr>
+          <p:nvPr/>
+        </p:nvPicPr>
+        <p:blipFill>
+          <a:blip r:embed="rId9" cstate="print"/>
+          <a:srcRect l="15807" r="8548" b="45807"/>
+          <a:stretch>
+            <a:fillRect/>
+          </a:stretch>
+        </p:blipFill>
+        <p:spPr>
+          <a:xfrm>
+            <a:off x="3888853" y="7146900"/>
+            <a:ext cx="6790089" cy="2736304"/>
+          </a:xfrm>
+          <a:prstGeom prst="rect">
+            <a:avLst/>
+          </a:prstGeom>
+        </p:spPr>
+      </p:pic>
+      <p:sp>
+        <p:nvSpPr>
+          <p:cNvPr id="18" name="TextBox 17"/>
+          <p:cNvSpPr txBox="1"/>
+          <p:nvPr/>
+        </p:nvSpPr>
+        <p:spPr>
+          <a:xfrm>
+            <a:off x="4752950" y="9811196"/>
+            <a:ext cx="4968552" cy="646331"/>
+          </a:xfrm>
+          <a:prstGeom prst="rect">
+            <a:avLst/>
+          </a:prstGeom>
+          <a:noFill/>
+        </p:spPr>
+        <p:txBody>
+          <a:bodyPr wrap="square" rtlCol="0">
+            <a:spAutoFit/>
+          </a:bodyPr>
+          <a:lstStyle/>
+          <a:p>
+            <a:r>
+              <a:rPr lang="en-GB" sz="1800" dirty="0" smtClean="0"/>
+              <a:t>The game  (Cropped) showing two bases and the input for the NLP</a:t>
+            </a:r>
+            <a:endParaRPr lang="en-GB" sz="1800" dirty="0"/>
+          </a:p>
+        </p:txBody>
+      </p:sp>
+      <p:sp>
+        <p:nvSpPr>
+          <p:cNvPr id="19" name="Rectangle 7"/>
+          <p:cNvSpPr>
+            <a:spLocks noChangeArrowheads="1"/>
+          </p:cNvSpPr>
+          <p:nvPr/>
+        </p:nvSpPr>
+        <p:spPr bwMode="auto">
+          <a:xfrm>
+            <a:off x="11233670" y="7002883"/>
+            <a:ext cx="3540125" cy="3384377"/>
+          </a:xfrm>
+          <a:prstGeom prst="rect">
+            <a:avLst/>
+          </a:prstGeom>
+          <a:solidFill>
+            <a:schemeClr val="bg1"/>
+          </a:solidFill>
+          <a:ln w="9525">
+            <a:solidFill>
+              <a:schemeClr val="tx1"/>
+            </a:solidFill>
+            <a:miter lim="800000"/>
+            <a:headEnd/>
+            <a:tailEnd/>
+          </a:ln>
+          <a:effectLst/>
+        </p:spPr>
+        <p:txBody>
+          <a:bodyPr wrap="square" anchor="t"/>
+          <a:lstStyle/>
+          <a:p>
+            <a:pPr algn="ctr"/>
+            <a:r>
+              <a:rPr lang="en-GB" sz="3200" b="1" dirty="0" smtClean="0"/>
+              <a:t>More Text Here</a:t>
+            </a:r>
+          </a:p>
+          <a:p>
+            <a:pPr algn="ctr"/>
+            <a:endParaRPr lang="en-GB" sz="3200" b="1" dirty="0" smtClean="0"/>
+          </a:p>
+          <a:p>
+            <a:endParaRPr lang="en-GB" sz="3200" dirty="0"/>
           </a:p>
         </p:txBody>
       </p:sp>

</xml_diff>

<commit_message>
Todays assignments and some work on the Pipeline
</commit_message>
<xml_diff>
--- a/Deadlines/Poster/CE301 Poster Template.pptx
+++ b/Deadlines/Poster/CE301 Poster Template.pptx
@@ -6412,15 +6412,15 @@
         </p:nvPicPr>
         <p:blipFill>
           <a:blip r:embed="rId9" cstate="print"/>
-          <a:srcRect l="15807" r="8548" b="45807"/>
+          <a:srcRect b="31579"/>
           <a:stretch>
             <a:fillRect/>
           </a:stretch>
         </p:blipFill>
         <p:spPr>
           <a:xfrm>
-            <a:off x="3888853" y="7146900"/>
-            <a:ext cx="6790089" cy="2736304"/>
+            <a:off x="3888854" y="7146900"/>
+            <a:ext cx="7109712" cy="2736304"/>
           </a:xfrm>
           <a:prstGeom prst="rect">
             <a:avLst/>
@@ -6467,8 +6467,8 @@
         </p:nvSpPr>
         <p:spPr bwMode="auto">
           <a:xfrm>
-            <a:off x="11233670" y="7002883"/>
-            <a:ext cx="3540125" cy="3384377"/>
+            <a:off x="11233670" y="6930876"/>
+            <a:ext cx="3540125" cy="3690516"/>
           </a:xfrm>
           <a:prstGeom prst="rect">
             <a:avLst/>
@@ -6493,11 +6493,15 @@
             <a:pPr algn="ctr"/>
             <a:r>
               <a:rPr lang="en-GB" sz="3200" b="1" dirty="0" smtClean="0"/>
-              <a:t>More Text Here</a:t>
-            </a:r>
-          </a:p>
-          <a:p>
-            <a:pPr algn="ctr"/>
+              <a:t>Possible Refinements</a:t>
+            </a:r>
+          </a:p>
+          <a:p>
+            <a:pPr algn="just"/>
+            <a:r>
+              <a:rPr lang="en-GB" sz="1400" dirty="0" smtClean="0"/>
+              <a:t>The AI could use some clever features to check if it is happy with the orders you have  given it. These could include trust systems that allow you to build up leverage with the AI. The AI could also propose slight alterations that go through less defended territory or use more or less units than originally planned. These could then be approved by the Human before interaction. Triggers could be added that allow timed actions between human and AI players.</a:t>
+            </a:r>
             <a:endParaRPr lang="en-GB" sz="3200" b="1" dirty="0" smtClean="0"/>
           </a:p>
           <a:p>

</xml_diff>